<commit_message>
Updated Classes and slides
</commit_message>
<xml_diff>
--- a/JUnit und Mockito.pptx
+++ b/JUnit und Mockito.pptx
@@ -110,6 +110,11 @@
       </a:defRPr>
     </a:lvl9pPr>
   </p:defaultTextStyle>
+  <p:extLst>
+    <p:ext uri="{EFAFB233-063F-42B5-8137-9DF3F51BA10A}">
+      <p15:sldGuideLst xmlns:p15="http://schemas.microsoft.com/office/powerpoint/2012/main"/>
+    </p:ext>
+  </p:extLst>
 </p:presentation>
 </file>
 
@@ -244,7 +249,7 @@
           <a:p>
             <a:fld id="{9952562E-E29E-41B4-8207-EF545946D3E0}" type="datetimeFigureOut">
               <a:rPr lang="de-DE" smtClean="0"/>
-              <a:t>21.11.2020</a:t>
+              <a:t>24.11.2020</a:t>
             </a:fld>
             <a:endParaRPr lang="de-DE"/>
           </a:p>
@@ -414,7 +419,7 @@
           <a:p>
             <a:fld id="{9952562E-E29E-41B4-8207-EF545946D3E0}" type="datetimeFigureOut">
               <a:rPr lang="de-DE" smtClean="0"/>
-              <a:t>21.11.2020</a:t>
+              <a:t>24.11.2020</a:t>
             </a:fld>
             <a:endParaRPr lang="de-DE"/>
           </a:p>
@@ -594,7 +599,7 @@
           <a:p>
             <a:fld id="{9952562E-E29E-41B4-8207-EF545946D3E0}" type="datetimeFigureOut">
               <a:rPr lang="de-DE" smtClean="0"/>
-              <a:t>21.11.2020</a:t>
+              <a:t>24.11.2020</a:t>
             </a:fld>
             <a:endParaRPr lang="de-DE"/>
           </a:p>
@@ -764,7 +769,7 @@
           <a:p>
             <a:fld id="{9952562E-E29E-41B4-8207-EF545946D3E0}" type="datetimeFigureOut">
               <a:rPr lang="de-DE" smtClean="0"/>
-              <a:t>21.11.2020</a:t>
+              <a:t>24.11.2020</a:t>
             </a:fld>
             <a:endParaRPr lang="de-DE"/>
           </a:p>
@@ -1010,7 +1015,7 @@
           <a:p>
             <a:fld id="{9952562E-E29E-41B4-8207-EF545946D3E0}" type="datetimeFigureOut">
               <a:rPr lang="de-DE" smtClean="0"/>
-              <a:t>21.11.2020</a:t>
+              <a:t>24.11.2020</a:t>
             </a:fld>
             <a:endParaRPr lang="de-DE"/>
           </a:p>
@@ -1242,7 +1247,7 @@
           <a:p>
             <a:fld id="{9952562E-E29E-41B4-8207-EF545946D3E0}" type="datetimeFigureOut">
               <a:rPr lang="de-DE" smtClean="0"/>
-              <a:t>21.11.2020</a:t>
+              <a:t>24.11.2020</a:t>
             </a:fld>
             <a:endParaRPr lang="de-DE"/>
           </a:p>
@@ -1609,7 +1614,7 @@
           <a:p>
             <a:fld id="{9952562E-E29E-41B4-8207-EF545946D3E0}" type="datetimeFigureOut">
               <a:rPr lang="de-DE" smtClean="0"/>
-              <a:t>21.11.2020</a:t>
+              <a:t>24.11.2020</a:t>
             </a:fld>
             <a:endParaRPr lang="de-DE"/>
           </a:p>
@@ -1727,7 +1732,7 @@
           <a:p>
             <a:fld id="{9952562E-E29E-41B4-8207-EF545946D3E0}" type="datetimeFigureOut">
               <a:rPr lang="de-DE" smtClean="0"/>
-              <a:t>21.11.2020</a:t>
+              <a:t>24.11.2020</a:t>
             </a:fld>
             <a:endParaRPr lang="de-DE"/>
           </a:p>
@@ -1822,7 +1827,7 @@
           <a:p>
             <a:fld id="{9952562E-E29E-41B4-8207-EF545946D3E0}" type="datetimeFigureOut">
               <a:rPr lang="de-DE" smtClean="0"/>
-              <a:t>21.11.2020</a:t>
+              <a:t>24.11.2020</a:t>
             </a:fld>
             <a:endParaRPr lang="de-DE"/>
           </a:p>
@@ -2099,7 +2104,7 @@
           <a:p>
             <a:fld id="{9952562E-E29E-41B4-8207-EF545946D3E0}" type="datetimeFigureOut">
               <a:rPr lang="de-DE" smtClean="0"/>
-              <a:t>21.11.2020</a:t>
+              <a:t>24.11.2020</a:t>
             </a:fld>
             <a:endParaRPr lang="de-DE"/>
           </a:p>
@@ -2356,7 +2361,7 @@
           <a:p>
             <a:fld id="{9952562E-E29E-41B4-8207-EF545946D3E0}" type="datetimeFigureOut">
               <a:rPr lang="de-DE" smtClean="0"/>
-              <a:t>21.11.2020</a:t>
+              <a:t>24.11.2020</a:t>
             </a:fld>
             <a:endParaRPr lang="de-DE"/>
           </a:p>
@@ -2569,7 +2574,7 @@
           <a:p>
             <a:fld id="{9952562E-E29E-41B4-8207-EF545946D3E0}" type="datetimeFigureOut">
               <a:rPr lang="de-DE" smtClean="0"/>
-              <a:t>21.11.2020</a:t>
+              <a:t>24.11.2020</a:t>
             </a:fld>
             <a:endParaRPr lang="de-DE"/>
           </a:p>
@@ -3264,9 +3269,10 @@
               <a:t>JUnit</a:t>
             </a:r>
             <a:r>
-              <a:rPr lang="de-DE" sz="3200" dirty="0"/>
-              <a:t> 5</a:t>
-            </a:r>
+              <a:rPr lang="de-DE" sz="3200"/>
+              <a:t> 4</a:t>
+            </a:r>
+            <a:endParaRPr lang="de-DE" sz="3200" dirty="0"/>
           </a:p>
           <a:p>
             <a:endParaRPr lang="de-DE" dirty="0"/>

</xml_diff>